<commit_message>
added new estimation graph
</commit_message>
<xml_diff>
--- a/PoS Systems_Final_Presentation.pptx
+++ b/PoS Systems_Final_Presentation.pptx
@@ -128,6 +128,11 @@
       </a:defRPr>
     </a:lvl9pPr>
   </p:defaultTextStyle>
+  <p:extLst>
+    <p:ext uri="{EFAFB233-063F-42B5-8137-9DF3F51BA10A}">
+      <p15:sldGuideLst xmlns:p15="http://schemas.microsoft.com/office/powerpoint/2012/main"/>
+    </p:ext>
+  </p:extLst>
 </p:presentation>
 </file>
 
@@ -9937,7 +9942,7 @@
       </p:sp>
       <p:pic>
         <p:nvPicPr>
-          <p:cNvPr id="4" name="Grafik 3"/>
+          <p:cNvPr id="2" name="Grafik 1"/>
           <p:cNvPicPr>
             <a:picLocks noChangeAspect="1"/>
           </p:cNvPicPr>
@@ -9957,8 +9962,8 @@
         </p:blipFill>
         <p:spPr>
           <a:xfrm>
-            <a:off x="2384945" y="1689480"/>
-            <a:ext cx="7420789" cy="4446277"/>
+            <a:off x="2267234" y="1689480"/>
+            <a:ext cx="7656212" cy="4587334"/>
           </a:xfrm>
           <a:prstGeom prst="rect">
             <a:avLst/>

</xml_diff>